<commit_message>
Update to sort command in developer guide
</commit_message>
<xml_diff>
--- a/docs/diagrams/SortSequenceDiagram.pptx
+++ b/docs/diagrams/SortSequenceDiagram.pptx
@@ -208,7 +208,7 @@
           <a:p>
             <a:fld id="{F5CC4B3F-88C1-4FFA-B1B6-F41C21DC6924}" type="datetimeFigureOut">
               <a:rPr lang="en-US" smtClean="0"/>
-              <a:t>10/13/2018</a:t>
+              <a:t>10/14/2018</a:t>
             </a:fld>
             <a:endParaRPr lang="en-US"/>
           </a:p>
@@ -654,7 +654,7 @@
           <a:p>
             <a:fld id="{78C97017-6FC3-485B-9764-EAC9E56C1D49}" type="datetimeFigureOut">
               <a:rPr lang="en-US" smtClean="0"/>
-              <a:t>10/13/2018</a:t>
+              <a:t>10/14/2018</a:t>
             </a:fld>
             <a:endParaRPr lang="en-US"/>
           </a:p>
@@ -822,7 +822,7 @@
           <a:p>
             <a:fld id="{78C97017-6FC3-485B-9764-EAC9E56C1D49}" type="datetimeFigureOut">
               <a:rPr lang="en-US" smtClean="0"/>
-              <a:t>10/13/2018</a:t>
+              <a:t>10/14/2018</a:t>
             </a:fld>
             <a:endParaRPr lang="en-US"/>
           </a:p>
@@ -1000,7 +1000,7 @@
           <a:p>
             <a:fld id="{78C97017-6FC3-485B-9764-EAC9E56C1D49}" type="datetimeFigureOut">
               <a:rPr lang="en-US" smtClean="0"/>
-              <a:t>10/13/2018</a:t>
+              <a:t>10/14/2018</a:t>
             </a:fld>
             <a:endParaRPr lang="en-US"/>
           </a:p>
@@ -1168,7 +1168,7 @@
           <a:p>
             <a:fld id="{78C97017-6FC3-485B-9764-EAC9E56C1D49}" type="datetimeFigureOut">
               <a:rPr lang="en-US" smtClean="0"/>
-              <a:t>10/13/2018</a:t>
+              <a:t>10/14/2018</a:t>
             </a:fld>
             <a:endParaRPr lang="en-US"/>
           </a:p>
@@ -1413,7 +1413,7 @@
           <a:p>
             <a:fld id="{78C97017-6FC3-485B-9764-EAC9E56C1D49}" type="datetimeFigureOut">
               <a:rPr lang="en-US" smtClean="0"/>
-              <a:t>10/13/2018</a:t>
+              <a:t>10/14/2018</a:t>
             </a:fld>
             <a:endParaRPr lang="en-US"/>
           </a:p>
@@ -1698,7 +1698,7 @@
           <a:p>
             <a:fld id="{78C97017-6FC3-485B-9764-EAC9E56C1D49}" type="datetimeFigureOut">
               <a:rPr lang="en-US" smtClean="0"/>
-              <a:t>10/13/2018</a:t>
+              <a:t>10/14/2018</a:t>
             </a:fld>
             <a:endParaRPr lang="en-US"/>
           </a:p>
@@ -2117,7 +2117,7 @@
           <a:p>
             <a:fld id="{78C97017-6FC3-485B-9764-EAC9E56C1D49}" type="datetimeFigureOut">
               <a:rPr lang="en-US" smtClean="0"/>
-              <a:t>10/13/2018</a:t>
+              <a:t>10/14/2018</a:t>
             </a:fld>
             <a:endParaRPr lang="en-US"/>
           </a:p>
@@ -2234,7 +2234,7 @@
           <a:p>
             <a:fld id="{78C97017-6FC3-485B-9764-EAC9E56C1D49}" type="datetimeFigureOut">
               <a:rPr lang="en-US" smtClean="0"/>
-              <a:t>10/13/2018</a:t>
+              <a:t>10/14/2018</a:t>
             </a:fld>
             <a:endParaRPr lang="en-US"/>
           </a:p>
@@ -2329,7 +2329,7 @@
           <a:p>
             <a:fld id="{78C97017-6FC3-485B-9764-EAC9E56C1D49}" type="datetimeFigureOut">
               <a:rPr lang="en-US" smtClean="0"/>
-              <a:t>10/13/2018</a:t>
+              <a:t>10/14/2018</a:t>
             </a:fld>
             <a:endParaRPr lang="en-US"/>
           </a:p>
@@ -2604,7 +2604,7 @@
           <a:p>
             <a:fld id="{78C97017-6FC3-485B-9764-EAC9E56C1D49}" type="datetimeFigureOut">
               <a:rPr lang="en-US" smtClean="0"/>
-              <a:t>10/13/2018</a:t>
+              <a:t>10/14/2018</a:t>
             </a:fld>
             <a:endParaRPr lang="en-US"/>
           </a:p>
@@ -2856,7 +2856,7 @@
           <a:p>
             <a:fld id="{78C97017-6FC3-485B-9764-EAC9E56C1D49}" type="datetimeFigureOut">
               <a:rPr lang="en-US" smtClean="0"/>
-              <a:t>10/13/2018</a:t>
+              <a:t>10/14/2018</a:t>
             </a:fld>
             <a:endParaRPr lang="en-US"/>
           </a:p>
@@ -3067,7 +3067,7 @@
           <a:p>
             <a:fld id="{78C97017-6FC3-485B-9764-EAC9E56C1D49}" type="datetimeFigureOut">
               <a:rPr lang="en-US" smtClean="0"/>
-              <a:t>10/13/2018</a:t>
+              <a:t>10/14/2018</a:t>
             </a:fld>
             <a:endParaRPr lang="en-US"/>
           </a:p>
@@ -3450,8 +3450,8 @@
         </p:nvSpPr>
         <p:spPr>
           <a:xfrm>
-            <a:off x="6459374" y="118895"/>
-            <a:ext cx="2585111" cy="4400926"/>
+            <a:off x="6462268" y="171074"/>
+            <a:ext cx="4358132" cy="4335344"/>
           </a:xfrm>
           <a:prstGeom prst="roundRect">
             <a:avLst>
@@ -4282,7 +4282,7 @@
         </p:nvSpPr>
         <p:spPr>
           <a:xfrm>
-            <a:off x="5980472" y="2744929"/>
+            <a:off x="5969384" y="2749914"/>
             <a:ext cx="878422" cy="184666"/>
           </a:xfrm>
           <a:prstGeom prst="rect">
@@ -4314,7 +4314,7 @@
                   <a:srgbClr val="7030A0"/>
                 </a:solidFill>
               </a:rPr>
-              <a:t>getEventList</a:t>
+              <a:t>sortByName</a:t>
             </a:r>
             <a:r>
               <a:rPr lang="en-US" sz="1200" dirty="0">
@@ -4599,7 +4599,7 @@
         <p:spPr>
           <a:xfrm>
             <a:off x="6887527" y="2958107"/>
-            <a:ext cx="164422" cy="547094"/>
+            <a:ext cx="137126" cy="1203238"/>
           </a:xfrm>
           <a:prstGeom prst="rect">
             <a:avLst/>
@@ -4916,12 +4916,85 @@
           </a:fontRef>
         </p:style>
       </p:cxnSp>
+      <p:sp>
+        <p:nvSpPr>
+          <p:cNvPr id="48" name="Rectangle 62">
+            <a:extLst>
+              <a:ext uri="{FF2B5EF4-FFF2-40B4-BE49-F238E27FC236}">
+                <a16:creationId xmlns:a16="http://schemas.microsoft.com/office/drawing/2014/main" id="{4D23FA39-71AA-4097-948B-8B69345FAF5B}"/>
+              </a:ext>
+            </a:extLst>
+          </p:cNvPr>
+          <p:cNvSpPr/>
+          <p:nvPr/>
+        </p:nvSpPr>
+        <p:spPr>
+          <a:xfrm>
+            <a:off x="7214051" y="1899550"/>
+            <a:ext cx="1830434" cy="333846"/>
+          </a:xfrm>
+          <a:prstGeom prst="rect">
+            <a:avLst/>
+          </a:prstGeom>
+          <a:solidFill>
+            <a:srgbClr val="7030A0"/>
+          </a:solidFill>
+          <a:ln w="19050">
+            <a:solidFill>
+              <a:srgbClr val="7030A0"/>
+            </a:solidFill>
+          </a:ln>
+          <a:effectLst/>
+        </p:spPr>
+        <p:style>
+          <a:lnRef idx="1">
+            <a:schemeClr val="accent2"/>
+          </a:lnRef>
+          <a:fillRef idx="2">
+            <a:schemeClr val="accent2"/>
+          </a:fillRef>
+          <a:effectRef idx="1">
+            <a:schemeClr val="accent2"/>
+          </a:effectRef>
+          <a:fontRef idx="minor">
+            <a:schemeClr val="dk1"/>
+          </a:fontRef>
+        </p:style>
+        <p:txBody>
+          <a:bodyPr rtlCol="0" anchor="ctr"/>
+          <a:lstStyle/>
+          <a:p>
+            <a:pPr algn="ctr"/>
+            <a:r>
+              <a:rPr lang="en-US" sz="1600" dirty="0">
+                <a:solidFill>
+                  <a:schemeClr val="bg1"/>
+                </a:solidFill>
+              </a:rPr>
+              <a:t>: </a:t>
+            </a:r>
+            <a:r>
+              <a:rPr lang="en-US" sz="1600" dirty="0" err="1">
+                <a:solidFill>
+                  <a:schemeClr val="bg1"/>
+                </a:solidFill>
+              </a:rPr>
+              <a:t>ReadOnlyEventList</a:t>
+            </a:r>
+            <a:endParaRPr lang="en-SG" sz="1600" dirty="0">
+              <a:solidFill>
+                <a:schemeClr val="bg1"/>
+              </a:solidFill>
+            </a:endParaRPr>
+          </a:p>
+        </p:txBody>
+      </p:sp>
       <p:cxnSp>
         <p:nvCxnSpPr>
-          <p:cNvPr id="63" name="Straight Arrow Connector 62">
+          <p:cNvPr id="51" name="Straight Connector 50">
             <a:extLst>
               <a:ext uri="{FF2B5EF4-FFF2-40B4-BE49-F238E27FC236}">
-                <a16:creationId xmlns:a16="http://schemas.microsoft.com/office/drawing/2014/main" id="{7C9F21BC-13A9-471F-825A-2621FD36355F}"/>
+                <a16:creationId xmlns:a16="http://schemas.microsoft.com/office/drawing/2014/main" id="{DDBD79A9-8D7E-4A8B-A1A5-3EFD3BA2927D}"/>
               </a:ext>
             </a:extLst>
           </p:cNvPr>
@@ -4932,10 +5005,10 @@
         </p:nvCxnSpPr>
         <p:spPr>
           <a:xfrm>
-            <a:off x="5683749" y="3402965"/>
-            <a:ext cx="1296056" cy="0"/>
-          </a:xfrm>
-          <a:prstGeom prst="straightConnector1">
+            <a:off x="8130508" y="2233396"/>
+            <a:ext cx="0" cy="2155620"/>
+          </a:xfrm>
+          <a:prstGeom prst="line">
             <a:avLst/>
           </a:prstGeom>
           <a:ln w="19050">
@@ -4943,8 +5016,336 @@
               <a:srgbClr val="7030A0"/>
             </a:solidFill>
             <a:prstDash val="sysDash"/>
-            <a:headEnd type="arrow" w="med" len="med"/>
-            <a:tailEnd type="none" w="med" len="med"/>
+          </a:ln>
+          <a:effectLst/>
+        </p:spPr>
+        <p:style>
+          <a:lnRef idx="1">
+            <a:schemeClr val="accent1"/>
+          </a:lnRef>
+          <a:fillRef idx="2">
+            <a:schemeClr val="accent1"/>
+          </a:fillRef>
+          <a:effectRef idx="1">
+            <a:schemeClr val="accent1"/>
+          </a:effectRef>
+          <a:fontRef idx="minor">
+            <a:schemeClr val="dk1"/>
+          </a:fontRef>
+        </p:style>
+      </p:cxnSp>
+      <p:sp>
+        <p:nvSpPr>
+          <p:cNvPr id="53" name="Rectangle 52">
+            <a:extLst>
+              <a:ext uri="{FF2B5EF4-FFF2-40B4-BE49-F238E27FC236}">
+                <a16:creationId xmlns:a16="http://schemas.microsoft.com/office/drawing/2014/main" id="{232A9423-93F6-4CF7-80E9-F4F15CBF183C}"/>
+              </a:ext>
+            </a:extLst>
+          </p:cNvPr>
+          <p:cNvSpPr/>
+          <p:nvPr/>
+        </p:nvSpPr>
+        <p:spPr>
+          <a:xfrm>
+            <a:off x="8061675" y="3276603"/>
+            <a:ext cx="167925" cy="759859"/>
+          </a:xfrm>
+          <a:prstGeom prst="rect">
+            <a:avLst/>
+          </a:prstGeom>
+          <a:solidFill>
+            <a:srgbClr val="7030A0"/>
+          </a:solidFill>
+          <a:ln>
+            <a:solidFill>
+              <a:srgbClr val="7030A0"/>
+            </a:solidFill>
+          </a:ln>
+          <a:effectLst/>
+        </p:spPr>
+        <p:style>
+          <a:lnRef idx="1">
+            <a:schemeClr val="accent3"/>
+          </a:lnRef>
+          <a:fillRef idx="2">
+            <a:schemeClr val="accent3"/>
+          </a:fillRef>
+          <a:effectRef idx="1">
+            <a:schemeClr val="accent3"/>
+          </a:effectRef>
+          <a:fontRef idx="minor">
+            <a:schemeClr val="dk1"/>
+          </a:fontRef>
+        </p:style>
+        <p:txBody>
+          <a:bodyPr rtlCol="0" anchor="ctr"/>
+          <a:lstStyle/>
+          <a:p>
+            <a:pPr algn="ctr"/>
+            <a:endParaRPr lang="en-SG" sz="1400"/>
+          </a:p>
+        </p:txBody>
+      </p:sp>
+      <p:sp>
+        <p:nvSpPr>
+          <p:cNvPr id="57" name="TextBox 56">
+            <a:extLst>
+              <a:ext uri="{FF2B5EF4-FFF2-40B4-BE49-F238E27FC236}">
+                <a16:creationId xmlns:a16="http://schemas.microsoft.com/office/drawing/2014/main" id="{1AB24466-D0FE-4719-8532-A2E596F390AD}"/>
+              </a:ext>
+            </a:extLst>
+          </p:cNvPr>
+          <p:cNvSpPr txBox="1"/>
+          <p:nvPr/>
+        </p:nvSpPr>
+        <p:spPr>
+          <a:xfrm>
+            <a:off x="7133107" y="3218873"/>
+            <a:ext cx="878422" cy="184666"/>
+          </a:xfrm>
+          <a:prstGeom prst="rect">
+            <a:avLst/>
+          </a:prstGeom>
+          <a:noFill/>
+        </p:spPr>
+        <p:txBody>
+          <a:bodyPr wrap="square" lIns="0" tIns="0" rIns="0" bIns="0" rtlCol="0">
+            <a:spAutoFit/>
+          </a:bodyPr>
+          <a:lstStyle>
+            <a:defPPr>
+              <a:defRPr lang="en-US"/>
+            </a:defPPr>
+            <a:lvl1pPr algn="r">
+              <a:defRPr sz="1400">
+                <a:solidFill>
+                  <a:srgbClr val="0070C0"/>
+                </a:solidFill>
+              </a:defRPr>
+            </a:lvl1pPr>
+          </a:lstStyle>
+          <a:p>
+            <a:pPr algn="l"/>
+            <a:r>
+              <a:rPr lang="en-US" sz="1200" dirty="0" err="1">
+                <a:solidFill>
+                  <a:srgbClr val="7030A0"/>
+                </a:solidFill>
+              </a:rPr>
+              <a:t>sortByName</a:t>
+            </a:r>
+            <a:r>
+              <a:rPr lang="en-US" sz="1200" dirty="0">
+                <a:solidFill>
+                  <a:srgbClr val="7030A0"/>
+                </a:solidFill>
+              </a:rPr>
+              <a:t>()</a:t>
+            </a:r>
+            <a:endParaRPr lang="en-US" sz="1200" dirty="0"/>
+          </a:p>
+        </p:txBody>
+      </p:sp>
+      <p:sp>
+        <p:nvSpPr>
+          <p:cNvPr id="41" name="Rectangle 62">
+            <a:extLst>
+              <a:ext uri="{FF2B5EF4-FFF2-40B4-BE49-F238E27FC236}">
+                <a16:creationId xmlns:a16="http://schemas.microsoft.com/office/drawing/2014/main" id="{DB99BD7D-D90B-45BD-B9F3-737502DBBF2D}"/>
+              </a:ext>
+            </a:extLst>
+          </p:cNvPr>
+          <p:cNvSpPr/>
+          <p:nvPr/>
+        </p:nvSpPr>
+        <p:spPr>
+          <a:xfrm>
+            <a:off x="8412074" y="2342483"/>
+            <a:ext cx="1830434" cy="333846"/>
+          </a:xfrm>
+          <a:prstGeom prst="rect">
+            <a:avLst/>
+          </a:prstGeom>
+          <a:solidFill>
+            <a:srgbClr val="7030A0"/>
+          </a:solidFill>
+          <a:ln w="19050">
+            <a:solidFill>
+              <a:srgbClr val="7030A0"/>
+            </a:solidFill>
+          </a:ln>
+          <a:effectLst/>
+        </p:spPr>
+        <p:style>
+          <a:lnRef idx="1">
+            <a:schemeClr val="accent2"/>
+          </a:lnRef>
+          <a:fillRef idx="2">
+            <a:schemeClr val="accent2"/>
+          </a:fillRef>
+          <a:effectRef idx="1">
+            <a:schemeClr val="accent2"/>
+          </a:effectRef>
+          <a:fontRef idx="minor">
+            <a:schemeClr val="dk1"/>
+          </a:fontRef>
+        </p:style>
+        <p:txBody>
+          <a:bodyPr rtlCol="0" anchor="ctr"/>
+          <a:lstStyle/>
+          <a:p>
+            <a:pPr algn="ctr"/>
+            <a:r>
+              <a:rPr lang="en-US" sz="1600" dirty="0">
+                <a:solidFill>
+                  <a:schemeClr val="bg1"/>
+                </a:solidFill>
+              </a:rPr>
+              <a:t>: </a:t>
+            </a:r>
+            <a:r>
+              <a:rPr lang="en-US" sz="1600" dirty="0" err="1">
+                <a:solidFill>
+                  <a:schemeClr val="bg1"/>
+                </a:solidFill>
+              </a:rPr>
+              <a:t>UniqueEventList</a:t>
+            </a:r>
+            <a:endParaRPr lang="en-SG" sz="1600" dirty="0">
+              <a:solidFill>
+                <a:schemeClr val="bg1"/>
+              </a:solidFill>
+            </a:endParaRPr>
+          </a:p>
+        </p:txBody>
+      </p:sp>
+      <p:cxnSp>
+        <p:nvCxnSpPr>
+          <p:cNvPr id="42" name="Straight Connector 41">
+            <a:extLst>
+              <a:ext uri="{FF2B5EF4-FFF2-40B4-BE49-F238E27FC236}">
+                <a16:creationId xmlns:a16="http://schemas.microsoft.com/office/drawing/2014/main" id="{F24DA641-1C0D-4BDB-81FC-BD438C36F54F}"/>
+              </a:ext>
+            </a:extLst>
+          </p:cNvPr>
+          <p:cNvCxnSpPr>
+            <a:cxnSpLocks/>
+          </p:cNvCxnSpPr>
+          <p:nvPr/>
+        </p:nvCxnSpPr>
+        <p:spPr>
+          <a:xfrm>
+            <a:off x="9372600" y="2676329"/>
+            <a:ext cx="0" cy="1712687"/>
+          </a:xfrm>
+          <a:prstGeom prst="line">
+            <a:avLst/>
+          </a:prstGeom>
+          <a:ln w="19050">
+            <a:solidFill>
+              <a:srgbClr val="7030A0"/>
+            </a:solidFill>
+            <a:prstDash val="sysDash"/>
+          </a:ln>
+          <a:effectLst/>
+        </p:spPr>
+        <p:style>
+          <a:lnRef idx="1">
+            <a:schemeClr val="accent1"/>
+          </a:lnRef>
+          <a:fillRef idx="2">
+            <a:schemeClr val="accent1"/>
+          </a:fillRef>
+          <a:effectRef idx="1">
+            <a:schemeClr val="accent1"/>
+          </a:effectRef>
+          <a:fontRef idx="minor">
+            <a:schemeClr val="dk1"/>
+          </a:fontRef>
+        </p:style>
+      </p:cxnSp>
+      <p:sp>
+        <p:nvSpPr>
+          <p:cNvPr id="45" name="Rectangle 44">
+            <a:extLst>
+              <a:ext uri="{FF2B5EF4-FFF2-40B4-BE49-F238E27FC236}">
+                <a16:creationId xmlns:a16="http://schemas.microsoft.com/office/drawing/2014/main" id="{BF7AE52A-2FFC-4E00-A8B9-E8FE67A9E11A}"/>
+              </a:ext>
+            </a:extLst>
+          </p:cNvPr>
+          <p:cNvSpPr/>
+          <p:nvPr/>
+        </p:nvSpPr>
+        <p:spPr>
+          <a:xfrm>
+            <a:off x="9290391" y="3670419"/>
+            <a:ext cx="143856" cy="359720"/>
+          </a:xfrm>
+          <a:prstGeom prst="rect">
+            <a:avLst/>
+          </a:prstGeom>
+          <a:solidFill>
+            <a:srgbClr val="7030A0"/>
+          </a:solidFill>
+          <a:ln>
+            <a:solidFill>
+              <a:srgbClr val="7030A0"/>
+            </a:solidFill>
+          </a:ln>
+          <a:effectLst/>
+        </p:spPr>
+        <p:style>
+          <a:lnRef idx="1">
+            <a:schemeClr val="accent3"/>
+          </a:lnRef>
+          <a:fillRef idx="2">
+            <a:schemeClr val="accent3"/>
+          </a:fillRef>
+          <a:effectRef idx="1">
+            <a:schemeClr val="accent3"/>
+          </a:effectRef>
+          <a:fontRef idx="minor">
+            <a:schemeClr val="dk1"/>
+          </a:fontRef>
+        </p:style>
+        <p:txBody>
+          <a:bodyPr rtlCol="0" anchor="ctr"/>
+          <a:lstStyle/>
+          <a:p>
+            <a:pPr algn="ctr"/>
+            <a:endParaRPr lang="en-SG" sz="1400"/>
+          </a:p>
+        </p:txBody>
+      </p:sp>
+      <p:cxnSp>
+        <p:nvCxnSpPr>
+          <p:cNvPr id="52" name="Curved Connector 12">
+            <a:extLst>
+              <a:ext uri="{FF2B5EF4-FFF2-40B4-BE49-F238E27FC236}">
+                <a16:creationId xmlns:a16="http://schemas.microsoft.com/office/drawing/2014/main" id="{2B538C78-CF82-4C4D-B61C-FE35489A96A1}"/>
+              </a:ext>
+            </a:extLst>
+          </p:cNvPr>
+          <p:cNvCxnSpPr/>
+          <p:nvPr/>
+        </p:nvCxnSpPr>
+        <p:spPr>
+          <a:xfrm rot="16200000" flipH="1">
+            <a:off x="9354817" y="3697962"/>
+            <a:ext cx="156923" cy="76200"/>
+          </a:xfrm>
+          <a:prstGeom prst="curvedConnector4">
+            <a:avLst>
+              <a:gd name="adj1" fmla="val -145677"/>
+              <a:gd name="adj2" fmla="val 400000"/>
+            </a:avLst>
+          </a:prstGeom>
+          <a:ln>
+            <a:solidFill>
+              <a:srgbClr val="7030A0"/>
+            </a:solidFill>
+            <a:tailEnd type="triangle"/>
           </a:ln>
         </p:spPr>
         <p:style>
@@ -4962,12 +5363,56 @@
           </a:fontRef>
         </p:style>
       </p:cxnSp>
-      <p:sp>
-        <p:nvSpPr>
-          <p:cNvPr id="44" name="TextBox 43">
+      <p:cxnSp>
+        <p:nvCxnSpPr>
+          <p:cNvPr id="55" name="Straight Arrow Connector 54">
             <a:extLst>
               <a:ext uri="{FF2B5EF4-FFF2-40B4-BE49-F238E27FC236}">
-                <a16:creationId xmlns:a16="http://schemas.microsoft.com/office/drawing/2014/main" id="{DF857FD6-8E21-435F-80DC-BB3763D4F7AE}"/>
+                <a16:creationId xmlns:a16="http://schemas.microsoft.com/office/drawing/2014/main" id="{25CFCD23-6378-4A03-97A5-99EFA0B9AD1C}"/>
+              </a:ext>
+            </a:extLst>
+          </p:cNvPr>
+          <p:cNvCxnSpPr>
+            <a:cxnSpLocks/>
+          </p:cNvCxnSpPr>
+          <p:nvPr/>
+        </p:nvCxnSpPr>
+        <p:spPr>
+          <a:xfrm>
+            <a:off x="8229600" y="3742180"/>
+            <a:ext cx="1066800" cy="0"/>
+          </a:xfrm>
+          <a:prstGeom prst="straightConnector1">
+            <a:avLst/>
+          </a:prstGeom>
+          <a:ln w="19050">
+            <a:solidFill>
+              <a:srgbClr val="7030A0"/>
+            </a:solidFill>
+            <a:tailEnd type="arrow"/>
+          </a:ln>
+        </p:spPr>
+        <p:style>
+          <a:lnRef idx="1">
+            <a:schemeClr val="accent1"/>
+          </a:lnRef>
+          <a:fillRef idx="0">
+            <a:schemeClr val="accent1"/>
+          </a:fillRef>
+          <a:effectRef idx="0">
+            <a:schemeClr val="accent1"/>
+          </a:effectRef>
+          <a:fontRef idx="minor">
+            <a:schemeClr val="tx1"/>
+          </a:fontRef>
+        </p:style>
+      </p:cxnSp>
+      <p:sp>
+        <p:nvSpPr>
+          <p:cNvPr id="58" name="TextBox 57">
+            <a:extLst>
+              <a:ext uri="{FF2B5EF4-FFF2-40B4-BE49-F238E27FC236}">
+                <a16:creationId xmlns:a16="http://schemas.microsoft.com/office/drawing/2014/main" id="{5B38822A-BD89-41E1-8B21-4E204693814F}"/>
               </a:ext>
             </a:extLst>
           </p:cNvPr>
@@ -4976,8 +5421,8 @@
         </p:nvSpPr>
         <p:spPr>
           <a:xfrm>
-            <a:off x="5652246" y="3190850"/>
-            <a:ext cx="1376727" cy="184666"/>
+            <a:off x="8301834" y="3568329"/>
+            <a:ext cx="878422" cy="184666"/>
           </a:xfrm>
           <a:prstGeom prst="rect">
             <a:avLst/>
@@ -5003,104 +5448,99 @@
           <a:p>
             <a:pPr algn="l"/>
             <a:r>
+              <a:rPr lang="en-US" sz="1200" dirty="0" err="1">
+                <a:solidFill>
+                  <a:srgbClr val="7030A0"/>
+                </a:solidFill>
+              </a:rPr>
+              <a:t>sortByName</a:t>
+            </a:r>
+            <a:r>
               <a:rPr lang="en-US" sz="1200" dirty="0">
                 <a:solidFill>
                   <a:srgbClr val="7030A0"/>
                 </a:solidFill>
               </a:rPr>
-              <a:t>  </a:t>
-            </a:r>
+              <a:t>()</a:t>
+            </a:r>
+            <a:endParaRPr lang="en-US" sz="1200" dirty="0"/>
+          </a:p>
+        </p:txBody>
+      </p:sp>
+      <p:sp>
+        <p:nvSpPr>
+          <p:cNvPr id="59" name="TextBox 58">
+            <a:extLst>
+              <a:ext uri="{FF2B5EF4-FFF2-40B4-BE49-F238E27FC236}">
+                <a16:creationId xmlns:a16="http://schemas.microsoft.com/office/drawing/2014/main" id="{5B8FD65C-E0DC-4361-9C52-B2F48CC0D018}"/>
+              </a:ext>
+            </a:extLst>
+          </p:cNvPr>
+          <p:cNvSpPr txBox="1"/>
+          <p:nvPr/>
+        </p:nvSpPr>
+        <p:spPr>
+          <a:xfrm>
+            <a:off x="9406151" y="3048000"/>
+            <a:ext cx="1411355" cy="369332"/>
+          </a:xfrm>
+          <a:prstGeom prst="rect">
+            <a:avLst/>
+          </a:prstGeom>
+          <a:noFill/>
+        </p:spPr>
+        <p:txBody>
+          <a:bodyPr wrap="square" lIns="0" tIns="0" rIns="0" bIns="0" rtlCol="0">
+            <a:spAutoFit/>
+          </a:bodyPr>
+          <a:lstStyle>
+            <a:defPPr>
+              <a:defRPr lang="en-US"/>
+            </a:defPPr>
+            <a:lvl1pPr algn="r">
+              <a:defRPr sz="1400">
+                <a:solidFill>
+                  <a:srgbClr val="0070C0"/>
+                </a:solidFill>
+              </a:defRPr>
+            </a:lvl1pPr>
+          </a:lstStyle>
+          <a:p>
+            <a:pPr algn="l"/>
             <a:r>
               <a:rPr lang="en-US" sz="1200" dirty="0" err="1">
                 <a:solidFill>
                   <a:srgbClr val="7030A0"/>
                 </a:solidFill>
               </a:rPr>
-              <a:t>ReadOnlyEventList</a:t>
+              <a:t>ObservableList.sort</a:t>
+            </a:r>
+            <a:endParaRPr lang="en-US" sz="1200" dirty="0">
+              <a:solidFill>
+                <a:srgbClr val="7030A0"/>
+              </a:solidFill>
+            </a:endParaRPr>
+          </a:p>
+          <a:p>
+            <a:pPr algn="l"/>
+            <a:r>
+              <a:rPr lang="en-US" sz="1200" dirty="0">
+                <a:solidFill>
+                  <a:srgbClr val="7030A0"/>
+                </a:solidFill>
+              </a:rPr>
+              <a:t>(Comparator&lt;Event&gt;)</a:t>
             </a:r>
             <a:endParaRPr lang="en-US" sz="1200" dirty="0"/>
           </a:p>
         </p:txBody>
       </p:sp>
-      <p:sp>
-        <p:nvSpPr>
-          <p:cNvPr id="48" name="Rectangle 62">
+      <p:cxnSp>
+        <p:nvCxnSpPr>
+          <p:cNvPr id="60" name="Straight Arrow Connector 59">
             <a:extLst>
               <a:ext uri="{FF2B5EF4-FFF2-40B4-BE49-F238E27FC236}">
-                <a16:creationId xmlns:a16="http://schemas.microsoft.com/office/drawing/2014/main" id="{4D23FA39-71AA-4097-948B-8B69345FAF5B}"/>
-              </a:ext>
-            </a:extLst>
-          </p:cNvPr>
-          <p:cNvSpPr/>
-          <p:nvPr/>
-        </p:nvSpPr>
-        <p:spPr>
-          <a:xfrm>
-            <a:off x="7214051" y="1899550"/>
-            <a:ext cx="1830434" cy="333846"/>
-          </a:xfrm>
-          <a:prstGeom prst="rect">
-            <a:avLst/>
-          </a:prstGeom>
-          <a:solidFill>
-            <a:srgbClr val="7030A0"/>
-          </a:solidFill>
-          <a:ln w="19050">
-            <a:solidFill>
-              <a:srgbClr val="7030A0"/>
-            </a:solidFill>
-          </a:ln>
-          <a:effectLst/>
-        </p:spPr>
-        <p:style>
-          <a:lnRef idx="1">
-            <a:schemeClr val="accent2"/>
-          </a:lnRef>
-          <a:fillRef idx="2">
-            <a:schemeClr val="accent2"/>
-          </a:fillRef>
-          <a:effectRef idx="1">
-            <a:schemeClr val="accent2"/>
-          </a:effectRef>
-          <a:fontRef idx="minor">
-            <a:schemeClr val="dk1"/>
-          </a:fontRef>
-        </p:style>
-        <p:txBody>
-          <a:bodyPr rtlCol="0" anchor="ctr"/>
-          <a:lstStyle/>
-          <a:p>
-            <a:pPr algn="ctr"/>
-            <a:r>
-              <a:rPr lang="en-US" sz="1600" dirty="0">
-                <a:solidFill>
-                  <a:schemeClr val="bg1"/>
-                </a:solidFill>
-              </a:rPr>
-              <a:t>: </a:t>
-            </a:r>
-            <a:r>
-              <a:rPr lang="en-US" sz="1600" dirty="0" err="1">
-                <a:solidFill>
-                  <a:schemeClr val="bg1"/>
-                </a:solidFill>
-              </a:rPr>
-              <a:t>ReadOnlyEventList</a:t>
-            </a:r>
-            <a:endParaRPr lang="en-SG" sz="1600" dirty="0">
-              <a:solidFill>
-                <a:schemeClr val="bg1"/>
-              </a:solidFill>
-            </a:endParaRPr>
-          </a:p>
-        </p:txBody>
-      </p:sp>
-      <p:cxnSp>
-        <p:nvCxnSpPr>
-          <p:cNvPr id="51" name="Straight Connector 50">
-            <a:extLst>
-              <a:ext uri="{FF2B5EF4-FFF2-40B4-BE49-F238E27FC236}">
-                <a16:creationId xmlns:a16="http://schemas.microsoft.com/office/drawing/2014/main" id="{DDBD79A9-8D7E-4A8B-A1A5-3EFD3BA2927D}"/>
+                <a16:creationId xmlns:a16="http://schemas.microsoft.com/office/drawing/2014/main" id="{93BDD94A-F3ED-4D28-9E46-3B4A11C770F1}"/>
               </a:ext>
             </a:extLst>
           </p:cNvPr>
@@ -5110,11 +5550,11 @@
           <p:nvPr/>
         </p:nvCxnSpPr>
         <p:spPr>
-          <a:xfrm>
-            <a:off x="8130508" y="2233396"/>
-            <a:ext cx="0" cy="2155620"/>
-          </a:xfrm>
-          <a:prstGeom prst="line">
+          <a:xfrm flipV="1">
+            <a:off x="8229600" y="3886200"/>
+            <a:ext cx="1051644" cy="1"/>
+          </a:xfrm>
+          <a:prstGeom prst="straightConnector1">
             <a:avLst/>
           </a:prstGeom>
           <a:ln w="19050">
@@ -5122,104 +5562,8 @@
               <a:srgbClr val="7030A0"/>
             </a:solidFill>
             <a:prstDash val="sysDash"/>
-          </a:ln>
-          <a:effectLst/>
-        </p:spPr>
-        <p:style>
-          <a:lnRef idx="1">
-            <a:schemeClr val="accent1"/>
-          </a:lnRef>
-          <a:fillRef idx="2">
-            <a:schemeClr val="accent1"/>
-          </a:fillRef>
-          <a:effectRef idx="1">
-            <a:schemeClr val="accent1"/>
-          </a:effectRef>
-          <a:fontRef idx="minor">
-            <a:schemeClr val="dk1"/>
-          </a:fontRef>
-        </p:style>
-      </p:cxnSp>
-      <p:sp>
-        <p:nvSpPr>
-          <p:cNvPr id="53" name="Rectangle 52">
-            <a:extLst>
-              <a:ext uri="{FF2B5EF4-FFF2-40B4-BE49-F238E27FC236}">
-                <a16:creationId xmlns:a16="http://schemas.microsoft.com/office/drawing/2014/main" id="{232A9423-93F6-4CF7-80E9-F4F15CBF183C}"/>
-              </a:ext>
-            </a:extLst>
-          </p:cNvPr>
-          <p:cNvSpPr/>
-          <p:nvPr/>
-        </p:nvSpPr>
-        <p:spPr>
-          <a:xfrm>
-            <a:off x="8065178" y="3489368"/>
-            <a:ext cx="164422" cy="547094"/>
-          </a:xfrm>
-          <a:prstGeom prst="rect">
-            <a:avLst/>
-          </a:prstGeom>
-          <a:solidFill>
-            <a:srgbClr val="7030A0"/>
-          </a:solidFill>
-          <a:ln>
-            <a:solidFill>
-              <a:srgbClr val="7030A0"/>
-            </a:solidFill>
-          </a:ln>
-          <a:effectLst/>
-        </p:spPr>
-        <p:style>
-          <a:lnRef idx="1">
-            <a:schemeClr val="accent3"/>
-          </a:lnRef>
-          <a:fillRef idx="2">
-            <a:schemeClr val="accent3"/>
-          </a:fillRef>
-          <a:effectRef idx="1">
-            <a:schemeClr val="accent3"/>
-          </a:effectRef>
-          <a:fontRef idx="minor">
-            <a:schemeClr val="dk1"/>
-          </a:fontRef>
-        </p:style>
-        <p:txBody>
-          <a:bodyPr rtlCol="0" anchor="ctr"/>
-          <a:lstStyle/>
-          <a:p>
-            <a:pPr algn="ctr"/>
-            <a:endParaRPr lang="en-SG" sz="1400"/>
-          </a:p>
-        </p:txBody>
-      </p:sp>
-      <p:cxnSp>
-        <p:nvCxnSpPr>
-          <p:cNvPr id="54" name="Straight Arrow Connector 53">
-            <a:extLst>
-              <a:ext uri="{FF2B5EF4-FFF2-40B4-BE49-F238E27FC236}">
-                <a16:creationId xmlns:a16="http://schemas.microsoft.com/office/drawing/2014/main" id="{398A67A9-FAF9-41C8-8FB5-04E2A16F171E}"/>
-              </a:ext>
-            </a:extLst>
-          </p:cNvPr>
-          <p:cNvCxnSpPr>
-            <a:cxnSpLocks/>
-          </p:cNvCxnSpPr>
-          <p:nvPr/>
-        </p:nvCxnSpPr>
-        <p:spPr>
-          <a:xfrm>
-            <a:off x="5694079" y="3691619"/>
-            <a:ext cx="2386896" cy="6154"/>
-          </a:xfrm>
-          <a:prstGeom prst="straightConnector1">
-            <a:avLst/>
-          </a:prstGeom>
-          <a:ln w="19050">
-            <a:solidFill>
-              <a:srgbClr val="0070C0"/>
-            </a:solidFill>
-            <a:tailEnd type="arrow"/>
+            <a:headEnd type="arrow" w="med" len="med"/>
+            <a:tailEnd type="none" w="med" len="med"/>
           </a:ln>
         </p:spPr>
         <p:style>
@@ -5237,66 +5581,142 @@
           </a:fontRef>
         </p:style>
       </p:cxnSp>
-      <p:sp>
-        <p:nvSpPr>
-          <p:cNvPr id="57" name="TextBox 56">
+      <p:cxnSp>
+        <p:nvCxnSpPr>
+          <p:cNvPr id="61" name="Straight Arrow Connector 60">
             <a:extLst>
               <a:ext uri="{FF2B5EF4-FFF2-40B4-BE49-F238E27FC236}">
-                <a16:creationId xmlns:a16="http://schemas.microsoft.com/office/drawing/2014/main" id="{1AB24466-D0FE-4719-8532-A2E596F390AD}"/>
+                <a16:creationId xmlns:a16="http://schemas.microsoft.com/office/drawing/2014/main" id="{A0B72D84-D60D-457B-A8C7-FF1CCDD585DC}"/>
               </a:ext>
             </a:extLst>
           </p:cNvPr>
-          <p:cNvSpPr txBox="1"/>
+          <p:cNvCxnSpPr>
+            <a:cxnSpLocks/>
+          </p:cNvCxnSpPr>
           <p:nvPr/>
-        </p:nvSpPr>
-        <p:spPr>
-          <a:xfrm>
-            <a:off x="5958696" y="3479503"/>
-            <a:ext cx="878422" cy="184666"/>
-          </a:xfrm>
-          <a:prstGeom prst="rect">
+        </p:nvCxnSpPr>
+        <p:spPr>
+          <a:xfrm flipV="1">
+            <a:off x="7033800" y="3953128"/>
+            <a:ext cx="1027875" cy="1"/>
+          </a:xfrm>
+          <a:prstGeom prst="straightConnector1">
             <a:avLst/>
           </a:prstGeom>
-          <a:noFill/>
-        </p:spPr>
-        <p:txBody>
-          <a:bodyPr wrap="square" lIns="0" tIns="0" rIns="0" bIns="0" rtlCol="0">
-            <a:spAutoFit/>
-          </a:bodyPr>
-          <a:lstStyle>
-            <a:defPPr>
-              <a:defRPr lang="en-US"/>
-            </a:defPPr>
-            <a:lvl1pPr algn="r">
-              <a:defRPr sz="1400">
-                <a:solidFill>
-                  <a:srgbClr val="0070C0"/>
-                </a:solidFill>
-              </a:defRPr>
-            </a:lvl1pPr>
-          </a:lstStyle>
-          <a:p>
-            <a:pPr algn="l"/>
-            <a:r>
-              <a:rPr lang="en-US" sz="1200" dirty="0" err="1">
-                <a:solidFill>
-                  <a:srgbClr val="7030A0"/>
-                </a:solidFill>
-              </a:rPr>
-              <a:t>sortByName</a:t>
-            </a:r>
-            <a:r>
-              <a:rPr lang="en-US" sz="1200" dirty="0">
-                <a:solidFill>
-                  <a:srgbClr val="7030A0"/>
-                </a:solidFill>
-              </a:rPr>
-              <a:t>()</a:t>
-            </a:r>
-            <a:endParaRPr lang="en-US" sz="1200" dirty="0"/>
-          </a:p>
-        </p:txBody>
-      </p:sp>
+          <a:ln w="19050">
+            <a:solidFill>
+              <a:srgbClr val="7030A0"/>
+            </a:solidFill>
+            <a:prstDash val="sysDash"/>
+            <a:headEnd type="arrow" w="med" len="med"/>
+            <a:tailEnd type="none" w="med" len="med"/>
+          </a:ln>
+        </p:spPr>
+        <p:style>
+          <a:lnRef idx="1">
+            <a:schemeClr val="accent1"/>
+          </a:lnRef>
+          <a:fillRef idx="0">
+            <a:schemeClr val="accent1"/>
+          </a:fillRef>
+          <a:effectRef idx="0">
+            <a:schemeClr val="accent1"/>
+          </a:effectRef>
+          <a:fontRef idx="minor">
+            <a:schemeClr val="tx1"/>
+          </a:fontRef>
+        </p:style>
+      </p:cxnSp>
+      <p:cxnSp>
+        <p:nvCxnSpPr>
+          <p:cNvPr id="62" name="Straight Arrow Connector 61">
+            <a:extLst>
+              <a:ext uri="{FF2B5EF4-FFF2-40B4-BE49-F238E27FC236}">
+                <a16:creationId xmlns:a16="http://schemas.microsoft.com/office/drawing/2014/main" id="{D1022484-6A69-4870-AA9E-DB678E84B88C}"/>
+              </a:ext>
+            </a:extLst>
+          </p:cNvPr>
+          <p:cNvCxnSpPr>
+            <a:cxnSpLocks/>
+          </p:cNvCxnSpPr>
+          <p:nvPr/>
+        </p:nvCxnSpPr>
+        <p:spPr>
+          <a:xfrm>
+            <a:off x="5702534" y="4001884"/>
+            <a:ext cx="1300874" cy="0"/>
+          </a:xfrm>
+          <a:prstGeom prst="straightConnector1">
+            <a:avLst/>
+          </a:prstGeom>
+          <a:ln w="19050">
+            <a:solidFill>
+              <a:srgbClr val="7030A0"/>
+            </a:solidFill>
+            <a:prstDash val="sysDash"/>
+            <a:headEnd type="arrow" w="med" len="med"/>
+            <a:tailEnd type="none" w="med" len="med"/>
+          </a:ln>
+        </p:spPr>
+        <p:style>
+          <a:lnRef idx="1">
+            <a:schemeClr val="accent1"/>
+          </a:lnRef>
+          <a:fillRef idx="0">
+            <a:schemeClr val="accent1"/>
+          </a:fillRef>
+          <a:effectRef idx="0">
+            <a:schemeClr val="accent1"/>
+          </a:effectRef>
+          <a:fontRef idx="minor">
+            <a:schemeClr val="tx1"/>
+          </a:fontRef>
+        </p:style>
+      </p:cxnSp>
+      <p:cxnSp>
+        <p:nvCxnSpPr>
+          <p:cNvPr id="64" name="Straight Arrow Connector 63">
+            <a:extLst>
+              <a:ext uri="{FF2B5EF4-FFF2-40B4-BE49-F238E27FC236}">
+                <a16:creationId xmlns:a16="http://schemas.microsoft.com/office/drawing/2014/main" id="{C96D19C1-BAF6-4B00-B9D1-9CAE218FE62E}"/>
+              </a:ext>
+            </a:extLst>
+          </p:cNvPr>
+          <p:cNvCxnSpPr>
+            <a:cxnSpLocks/>
+          </p:cNvCxnSpPr>
+          <p:nvPr/>
+        </p:nvCxnSpPr>
+        <p:spPr>
+          <a:xfrm flipV="1">
+            <a:off x="7011203" y="3403539"/>
+            <a:ext cx="1050472" cy="5705"/>
+          </a:xfrm>
+          <a:prstGeom prst="straightConnector1">
+            <a:avLst/>
+          </a:prstGeom>
+          <a:ln w="19050">
+            <a:solidFill>
+              <a:srgbClr val="7030A0"/>
+            </a:solidFill>
+            <a:tailEnd type="arrow"/>
+          </a:ln>
+        </p:spPr>
+        <p:style>
+          <a:lnRef idx="1">
+            <a:schemeClr val="accent1"/>
+          </a:lnRef>
+          <a:fillRef idx="0">
+            <a:schemeClr val="accent1"/>
+          </a:fillRef>
+          <a:effectRef idx="0">
+            <a:schemeClr val="accent1"/>
+          </a:effectRef>
+          <a:fontRef idx="minor">
+            <a:schemeClr val="tx1"/>
+          </a:fontRef>
+        </p:style>
+      </p:cxnSp>
     </p:spTree>
     <p:extLst>
       <p:ext uri="{BB962C8B-B14F-4D97-AF65-F5344CB8AC3E}">

</xml_diff>